<commit_message>
Christians slides added to the powerpoint
</commit_message>
<xml_diff>
--- a/Geometrische.pptx
+++ b/Geometrische.pptx
@@ -5,7 +5,7 @@
     <p:sldMasterId id="2147483660" r:id="rId1"/>
   </p:sldMasterIdLst>
   <p:notesMasterIdLst>
-    <p:notesMasterId r:id="rId15"/>
+    <p:notesMasterId r:id="rId21"/>
   </p:notesMasterIdLst>
   <p:sldIdLst>
     <p:sldId id="256" r:id="rId2"/>
@@ -21,6 +21,12 @@
     <p:sldId id="266" r:id="rId12"/>
     <p:sldId id="267" r:id="rId13"/>
     <p:sldId id="268" r:id="rId14"/>
+    <p:sldId id="269" r:id="rId15"/>
+    <p:sldId id="270" r:id="rId16"/>
+    <p:sldId id="271" r:id="rId17"/>
+    <p:sldId id="272" r:id="rId18"/>
+    <p:sldId id="273" r:id="rId19"/>
+    <p:sldId id="274" r:id="rId20"/>
   </p:sldIdLst>
   <p:sldSz cx="9144000" cy="6858000" type="screen4x3"/>
   <p:notesSz cx="6858000" cy="9144000"/>
@@ -204,7 +210,8 @@
           <a:p>
             <a:fld id="{77ABF578-F7DE-4785-86BD-A38DB1EA7F6F}" type="datetimeFigureOut">
               <a:rPr lang="de-DE" smtClean="0"/>
-              <a:t>06.07.2011</a:t>
+              <a:pPr/>
+              <a:t>07.07.2011</a:t>
             </a:fld>
             <a:endParaRPr lang="de-DE"/>
           </a:p>
@@ -363,6 +370,7 @@
           <a:p>
             <a:fld id="{EBB9BCD7-EBEF-4CD4-9789-DEB34A171E0C}" type="slidenum">
               <a:rPr lang="de-DE" smtClean="0"/>
+              <a:pPr/>
               <a:t>‹Nr.›</a:t>
             </a:fld>
             <a:endParaRPr lang="de-DE"/>
@@ -537,6 +545,7 @@
           <a:p>
             <a:fld id="{EBB9BCD7-EBEF-4CD4-9789-DEB34A171E0C}" type="slidenum">
               <a:rPr lang="de-DE" smtClean="0"/>
+              <a:pPr/>
               <a:t>5</a:t>
             </a:fld>
             <a:endParaRPr lang="de-DE"/>
@@ -1007,7 +1016,7 @@
               </a:pathLst>
             </a:custGeom>
             <a:blipFill>
-              <a:blip r:embed="rId2">
+              <a:blip r:embed="rId2" cstate="print">
                 <a:alphaModFix amt="50000"/>
               </a:blip>
               <a:tile tx="0" ty="0" sx="50000" sy="50000" flip="none" algn="t"/>
@@ -1181,7 +1190,8 @@
           <a:p>
             <a:fld id="{24860E20-58B9-45E3-86EF-04912660DBBC}" type="datetimeFigureOut">
               <a:rPr lang="de-DE" smtClean="0"/>
-              <a:t>06.07.2011</a:t>
+              <a:pPr/>
+              <a:t>07.07.2011</a:t>
             </a:fld>
             <a:endParaRPr lang="de-DE"/>
           </a:p>
@@ -1243,6 +1253,7 @@
           <a:p>
             <a:fld id="{5E12E669-1740-4FF5-B4FF-F8F59BA58B32}" type="slidenum">
               <a:rPr lang="de-DE" smtClean="0"/>
+              <a:pPr/>
               <a:t>‹Nr.›</a:t>
             </a:fld>
             <a:endParaRPr lang="de-DE"/>
@@ -1377,7 +1388,8 @@
           <a:p>
             <a:fld id="{24860E20-58B9-45E3-86EF-04912660DBBC}" type="datetimeFigureOut">
               <a:rPr lang="de-DE" smtClean="0"/>
-              <a:t>06.07.2011</a:t>
+              <a:pPr/>
+              <a:t>07.07.2011</a:t>
             </a:fld>
             <a:endParaRPr lang="de-DE"/>
           </a:p>
@@ -1423,6 +1435,7 @@
           <a:p>
             <a:fld id="{5E12E669-1740-4FF5-B4FF-F8F59BA58B32}" type="slidenum">
               <a:rPr lang="de-DE" smtClean="0"/>
+              <a:pPr/>
               <a:t>‹Nr.›</a:t>
             </a:fld>
             <a:endParaRPr lang="de-DE"/>
@@ -1562,7 +1575,8 @@
           <a:p>
             <a:fld id="{24860E20-58B9-45E3-86EF-04912660DBBC}" type="datetimeFigureOut">
               <a:rPr lang="de-DE" smtClean="0"/>
-              <a:t>06.07.2011</a:t>
+              <a:pPr/>
+              <a:t>07.07.2011</a:t>
             </a:fld>
             <a:endParaRPr lang="de-DE"/>
           </a:p>
@@ -1608,6 +1622,7 @@
           <a:p>
             <a:fld id="{5E12E669-1740-4FF5-B4FF-F8F59BA58B32}" type="slidenum">
               <a:rPr lang="de-DE" smtClean="0"/>
+              <a:pPr/>
               <a:t>‹Nr.›</a:t>
             </a:fld>
             <a:endParaRPr lang="de-DE"/>
@@ -1712,7 +1727,8 @@
           <a:p>
             <a:fld id="{24860E20-58B9-45E3-86EF-04912660DBBC}" type="datetimeFigureOut">
               <a:rPr lang="de-DE" smtClean="0"/>
-              <a:t>06.07.2011</a:t>
+              <a:pPr/>
+              <a:t>07.07.2011</a:t>
             </a:fld>
             <a:endParaRPr lang="de-DE"/>
           </a:p>
@@ -1758,6 +1774,7 @@
           <a:p>
             <a:fld id="{5E12E669-1740-4FF5-B4FF-F8F59BA58B32}" type="slidenum">
               <a:rPr lang="de-DE" smtClean="0"/>
+              <a:pPr/>
               <a:t>‹Nr.›</a:t>
             </a:fld>
             <a:endParaRPr lang="de-DE"/>
@@ -1967,7 +1984,8 @@
           <a:p>
             <a:fld id="{24860E20-58B9-45E3-86EF-04912660DBBC}" type="datetimeFigureOut">
               <a:rPr lang="de-DE" smtClean="0"/>
-              <a:t>06.07.2011</a:t>
+              <a:pPr/>
+              <a:t>07.07.2011</a:t>
             </a:fld>
             <a:endParaRPr lang="de-DE"/>
           </a:p>
@@ -2013,6 +2031,7 @@
           <a:p>
             <a:fld id="{5E12E669-1740-4FF5-B4FF-F8F59BA58B32}" type="slidenum">
               <a:rPr lang="de-DE" smtClean="0"/>
+              <a:pPr/>
               <a:t>‹Nr.›</a:t>
             </a:fld>
             <a:endParaRPr lang="de-DE"/>
@@ -2376,7 +2395,8 @@
           <a:p>
             <a:fld id="{24860E20-58B9-45E3-86EF-04912660DBBC}" type="datetimeFigureOut">
               <a:rPr lang="de-DE" smtClean="0"/>
-              <a:t>06.07.2011</a:t>
+              <a:pPr/>
+              <a:t>07.07.2011</a:t>
             </a:fld>
             <a:endParaRPr lang="de-DE"/>
           </a:p>
@@ -2422,6 +2442,7 @@
           <a:p>
             <a:fld id="{5E12E669-1740-4FF5-B4FF-F8F59BA58B32}" type="slidenum">
               <a:rPr lang="de-DE" smtClean="0"/>
+              <a:pPr/>
               <a:t>‹Nr.›</a:t>
             </a:fld>
             <a:endParaRPr lang="de-DE"/>
@@ -2822,7 +2843,8 @@
           <a:p>
             <a:fld id="{24860E20-58B9-45E3-86EF-04912660DBBC}" type="datetimeFigureOut">
               <a:rPr lang="de-DE" smtClean="0"/>
-              <a:t>06.07.2011</a:t>
+              <a:pPr/>
+              <a:t>07.07.2011</a:t>
             </a:fld>
             <a:endParaRPr lang="de-DE"/>
           </a:p>
@@ -2868,6 +2890,7 @@
           <a:p>
             <a:fld id="{5E12E669-1740-4FF5-B4FF-F8F59BA58B32}" type="slidenum">
               <a:rPr lang="de-DE" smtClean="0"/>
+              <a:pPr/>
               <a:t>‹Nr.›</a:t>
             </a:fld>
             <a:endParaRPr lang="de-DE"/>
@@ -2923,7 +2946,8 @@
           <a:p>
             <a:fld id="{24860E20-58B9-45E3-86EF-04912660DBBC}" type="datetimeFigureOut">
               <a:rPr lang="de-DE" smtClean="0"/>
-              <a:t>06.07.2011</a:t>
+              <a:pPr/>
+              <a:t>07.07.2011</a:t>
             </a:fld>
             <a:endParaRPr lang="de-DE"/>
           </a:p>
@@ -2969,6 +2993,7 @@
           <a:p>
             <a:fld id="{5E12E669-1740-4FF5-B4FF-F8F59BA58B32}" type="slidenum">
               <a:rPr lang="de-DE" smtClean="0"/>
+              <a:pPr/>
               <a:t>‹Nr.›</a:t>
             </a:fld>
             <a:endParaRPr lang="de-DE"/>
@@ -3044,7 +3069,8 @@
           <a:p>
             <a:fld id="{24860E20-58B9-45E3-86EF-04912660DBBC}" type="datetimeFigureOut">
               <a:rPr lang="de-DE" smtClean="0"/>
-              <a:t>06.07.2011</a:t>
+              <a:pPr/>
+              <a:t>07.07.2011</a:t>
             </a:fld>
             <a:endParaRPr lang="de-DE"/>
           </a:p>
@@ -3090,6 +3116,7 @@
           <a:p>
             <a:fld id="{5E12E669-1740-4FF5-B4FF-F8F59BA58B32}" type="slidenum">
               <a:rPr lang="de-DE" smtClean="0"/>
+              <a:pPr/>
               <a:t>‹Nr.›</a:t>
             </a:fld>
             <a:endParaRPr lang="de-DE"/>
@@ -3318,7 +3345,8 @@
           <a:p>
             <a:fld id="{24860E20-58B9-45E3-86EF-04912660DBBC}" type="datetimeFigureOut">
               <a:rPr lang="de-DE" smtClean="0"/>
-              <a:t>06.07.2011</a:t>
+              <a:pPr/>
+              <a:t>07.07.2011</a:t>
             </a:fld>
             <a:endParaRPr lang="de-DE"/>
           </a:p>
@@ -3364,6 +3392,7 @@
           <a:p>
             <a:fld id="{5E12E669-1740-4FF5-B4FF-F8F59BA58B32}" type="slidenum">
               <a:rPr lang="de-DE" smtClean="0"/>
+              <a:pPr/>
               <a:t>‹Nr.›</a:t>
             </a:fld>
             <a:endParaRPr lang="de-DE"/>
@@ -3523,7 +3552,8 @@
           <a:p>
             <a:fld id="{24860E20-58B9-45E3-86EF-04912660DBBC}" type="datetimeFigureOut">
               <a:rPr lang="de-DE" smtClean="0"/>
-              <a:t>06.07.2011</a:t>
+              <a:pPr/>
+              <a:t>07.07.2011</a:t>
             </a:fld>
             <a:endParaRPr lang="de-DE"/>
           </a:p>
@@ -3588,6 +3618,7 @@
           <a:p>
             <a:fld id="{5E12E669-1740-4FF5-B4FF-F8F59BA58B32}" type="slidenum">
               <a:rPr lang="de-DE" smtClean="0"/>
+              <a:pPr/>
               <a:t>‹Nr.›</a:t>
             </a:fld>
             <a:endParaRPr lang="de-DE"/>
@@ -3825,7 +3856,7 @@
             <a:avLst/>
           </a:prstGeom>
           <a:blipFill>
-            <a:blip r:embed="rId2">
+            <a:blip r:embed="rId2" cstate="print">
               <a:alphaModFix amt="50000"/>
             </a:blip>
             <a:tile tx="0" ty="0" sx="50000" sy="50000" flip="none" algn="t"/>
@@ -4345,7 +4376,7 @@
             <a:avLst/>
           </a:prstGeom>
           <a:blipFill>
-            <a:blip r:embed="rId13">
+            <a:blip r:embed="rId13" cstate="print">
               <a:alphaModFix amt="50000"/>
             </a:blip>
             <a:tile tx="0" ty="0" sx="50000" sy="50000" flip="none" algn="t"/>
@@ -4632,7 +4663,8 @@
           <a:p>
             <a:fld id="{24860E20-58B9-45E3-86EF-04912660DBBC}" type="datetimeFigureOut">
               <a:rPr lang="de-DE" smtClean="0"/>
-              <a:t>06.07.2011</a:t>
+              <a:pPr/>
+              <a:t>07.07.2011</a:t>
             </a:fld>
             <a:endParaRPr lang="de-DE"/>
           </a:p>
@@ -4708,6 +4740,7 @@
           <a:p>
             <a:fld id="{5E12E669-1740-4FF5-B4FF-F8F59BA58B32}" type="slidenum">
               <a:rPr lang="de-DE" smtClean="0"/>
+              <a:pPr/>
               <a:t>‹Nr.›</a:t>
             </a:fld>
             <a:endParaRPr lang="de-DE"/>
@@ -7847,6 +7880,460 @@
 </p:sld>
 </file>
 
+<file path=ppt/slides/slide14.xml><?xml version="1.0" encoding="utf-8"?>
+<p:sld xmlns:a="http://schemas.openxmlformats.org/drawingml/2006/main" xmlns:r="http://schemas.openxmlformats.org/officeDocument/2006/relationships" xmlns:p="http://schemas.openxmlformats.org/presentationml/2006/main">
+  <p:cSld>
+    <p:spTree>
+      <p:nvGrpSpPr>
+        <p:cNvPr id="1" name=""/>
+        <p:cNvGrpSpPr/>
+        <p:nvPr/>
+      </p:nvGrpSpPr>
+      <p:grpSpPr>
+        <a:xfrm>
+          <a:off x="0" y="0"/>
+          <a:ext cx="0" cy="0"/>
+          <a:chOff x="0" y="0"/>
+          <a:chExt cx="0" cy="0"/>
+        </a:xfrm>
+      </p:grpSpPr>
+      <p:sp>
+        <p:nvSpPr>
+          <p:cNvPr id="3" name="Inhaltsplatzhalter 2"/>
+          <p:cNvSpPr>
+            <a:spLocks noGrp="1"/>
+          </p:cNvSpPr>
+          <p:nvPr>
+            <p:ph idx="1"/>
+          </p:nvPr>
+        </p:nvSpPr>
+        <p:spPr/>
+        <p:txBody>
+          <a:bodyPr/>
+          <a:lstStyle/>
+          <a:p>
+            <a:endParaRPr lang="de-DE" smtClean="0"/>
+          </a:p>
+          <a:p>
+            <a:r>
+              <a:rPr lang="de-DE" smtClean="0"/>
+              <a:t>Wie kann man feststellen, ob der Mauszeiger innerhalb oder außerhalb einer unregelmäßig geformten Figur liegt?</a:t>
+            </a:r>
+            <a:endParaRPr lang="de-DE" dirty="0"/>
+          </a:p>
+        </p:txBody>
+      </p:sp>
+      <p:sp>
+        <p:nvSpPr>
+          <p:cNvPr id="2" name="Titel 1"/>
+          <p:cNvSpPr>
+            <a:spLocks noGrp="1"/>
+          </p:cNvSpPr>
+          <p:nvPr>
+            <p:ph type="title"/>
+          </p:nvPr>
+        </p:nvSpPr>
+        <p:spPr/>
+        <p:txBody>
+          <a:bodyPr/>
+          <a:lstStyle/>
+          <a:p>
+            <a:r>
+              <a:rPr lang="de-DE" smtClean="0"/>
+              <a:t>Kollisionserkennung</a:t>
+            </a:r>
+            <a:endParaRPr lang="de-DE" dirty="0"/>
+          </a:p>
+        </p:txBody>
+      </p:sp>
+    </p:spTree>
+  </p:cSld>
+  <p:clrMapOvr>
+    <a:masterClrMapping/>
+  </p:clrMapOvr>
+</p:sld>
+</file>
+
+<file path=ppt/slides/slide15.xml><?xml version="1.0" encoding="utf-8"?>
+<p:sld xmlns:a="http://schemas.openxmlformats.org/drawingml/2006/main" xmlns:r="http://schemas.openxmlformats.org/officeDocument/2006/relationships" xmlns:p="http://schemas.openxmlformats.org/presentationml/2006/main">
+  <p:cSld>
+    <p:spTree>
+      <p:nvGrpSpPr>
+        <p:cNvPr id="1" name=""/>
+        <p:cNvGrpSpPr/>
+        <p:nvPr/>
+      </p:nvGrpSpPr>
+      <p:grpSpPr>
+        <a:xfrm>
+          <a:off x="0" y="0"/>
+          <a:ext cx="0" cy="0"/>
+          <a:chOff x="0" y="0"/>
+          <a:chExt cx="0" cy="0"/>
+        </a:xfrm>
+      </p:grpSpPr>
+      <p:pic>
+        <p:nvPicPr>
+          <p:cNvPr id="2050" name="Picture 2"/>
+          <p:cNvPicPr>
+            <a:picLocks noGrp="1" noChangeAspect="1" noChangeArrowheads="1"/>
+          </p:cNvPicPr>
+          <p:nvPr>
+            <p:ph idx="1"/>
+          </p:nvPr>
+        </p:nvPicPr>
+        <p:blipFill>
+          <a:blip r:embed="rId2" cstate="print"/>
+          <a:srcRect/>
+          <a:stretch>
+            <a:fillRect/>
+          </a:stretch>
+        </p:blipFill>
+        <p:spPr>
+          <a:xfrm>
+            <a:off x="990599" y="2209800"/>
+            <a:ext cx="7026995" cy="2514600"/>
+          </a:xfrm>
+        </p:spPr>
+      </p:pic>
+      <p:sp>
+        <p:nvSpPr>
+          <p:cNvPr id="2" name="Titel 1"/>
+          <p:cNvSpPr>
+            <a:spLocks noGrp="1"/>
+          </p:cNvSpPr>
+          <p:nvPr>
+            <p:ph type="title"/>
+          </p:nvPr>
+        </p:nvSpPr>
+        <p:spPr/>
+        <p:txBody>
+          <a:bodyPr/>
+          <a:lstStyle/>
+          <a:p>
+            <a:r>
+              <a:rPr lang="de-DE" smtClean="0"/>
+              <a:t>Dreiecke</a:t>
+            </a:r>
+            <a:endParaRPr lang="de-DE" dirty="0"/>
+          </a:p>
+        </p:txBody>
+      </p:sp>
+    </p:spTree>
+  </p:cSld>
+  <p:clrMapOvr>
+    <a:masterClrMapping/>
+  </p:clrMapOvr>
+</p:sld>
+</file>
+
+<file path=ppt/slides/slide16.xml><?xml version="1.0" encoding="utf-8"?>
+<p:sld xmlns:a="http://schemas.openxmlformats.org/drawingml/2006/main" xmlns:r="http://schemas.openxmlformats.org/officeDocument/2006/relationships" xmlns:p="http://schemas.openxmlformats.org/presentationml/2006/main">
+  <p:cSld>
+    <p:spTree>
+      <p:nvGrpSpPr>
+        <p:cNvPr id="1" name=""/>
+        <p:cNvGrpSpPr/>
+        <p:nvPr/>
+      </p:nvGrpSpPr>
+      <p:grpSpPr>
+        <a:xfrm>
+          <a:off x="0" y="0"/>
+          <a:ext cx="0" cy="0"/>
+          <a:chOff x="0" y="0"/>
+          <a:chExt cx="0" cy="0"/>
+        </a:xfrm>
+      </p:grpSpPr>
+      <p:pic>
+        <p:nvPicPr>
+          <p:cNvPr id="3074" name="Picture 2"/>
+          <p:cNvPicPr>
+            <a:picLocks noGrp="1" noChangeAspect="1" noChangeArrowheads="1"/>
+          </p:cNvPicPr>
+          <p:nvPr>
+            <p:ph idx="1"/>
+          </p:nvPr>
+        </p:nvPicPr>
+        <p:blipFill>
+          <a:blip r:embed="rId2" cstate="print"/>
+          <a:srcRect/>
+          <a:stretch>
+            <a:fillRect/>
+          </a:stretch>
+        </p:blipFill>
+        <p:spPr>
+          <a:xfrm>
+            <a:off x="609600" y="2286000"/>
+            <a:ext cx="7264692" cy="2057400"/>
+          </a:xfrm>
+        </p:spPr>
+      </p:pic>
+      <p:sp>
+        <p:nvSpPr>
+          <p:cNvPr id="2" name="Titel 1"/>
+          <p:cNvSpPr>
+            <a:spLocks noGrp="1"/>
+          </p:cNvSpPr>
+          <p:nvPr>
+            <p:ph type="title"/>
+          </p:nvPr>
+        </p:nvSpPr>
+        <p:spPr/>
+        <p:txBody>
+          <a:bodyPr/>
+          <a:lstStyle/>
+          <a:p>
+            <a:r>
+              <a:rPr lang="de-DE" smtClean="0"/>
+              <a:t>Vierecke</a:t>
+            </a:r>
+            <a:endParaRPr lang="de-DE" dirty="0"/>
+          </a:p>
+        </p:txBody>
+      </p:sp>
+    </p:spTree>
+  </p:cSld>
+  <p:clrMapOvr>
+    <a:masterClrMapping/>
+  </p:clrMapOvr>
+</p:sld>
+</file>
+
+<file path=ppt/slides/slide17.xml><?xml version="1.0" encoding="utf-8"?>
+<p:sld xmlns:a="http://schemas.openxmlformats.org/drawingml/2006/main" xmlns:r="http://schemas.openxmlformats.org/officeDocument/2006/relationships" xmlns:p="http://schemas.openxmlformats.org/presentationml/2006/main">
+  <p:cSld>
+    <p:spTree>
+      <p:nvGrpSpPr>
+        <p:cNvPr id="1" name=""/>
+        <p:cNvGrpSpPr/>
+        <p:nvPr/>
+      </p:nvGrpSpPr>
+      <p:grpSpPr>
+        <a:xfrm>
+          <a:off x="0" y="0"/>
+          <a:ext cx="0" cy="0"/>
+          <a:chOff x="0" y="0"/>
+          <a:chExt cx="0" cy="0"/>
+        </a:xfrm>
+      </p:grpSpPr>
+      <p:sp>
+        <p:nvSpPr>
+          <p:cNvPr id="2" name="Titel 1"/>
+          <p:cNvSpPr>
+            <a:spLocks noGrp="1"/>
+          </p:cNvSpPr>
+          <p:nvPr>
+            <p:ph type="title"/>
+          </p:nvPr>
+        </p:nvSpPr>
+        <p:spPr/>
+        <p:txBody>
+          <a:bodyPr/>
+          <a:lstStyle/>
+          <a:p>
+            <a:r>
+              <a:rPr lang="de-DE" dirty="0" smtClean="0"/>
+              <a:t>Unregelmäßige Polygone</a:t>
+            </a:r>
+            <a:endParaRPr lang="de-DE" dirty="0"/>
+          </a:p>
+        </p:txBody>
+      </p:sp>
+      <p:pic>
+        <p:nvPicPr>
+          <p:cNvPr id="1026" name="Picture 2"/>
+          <p:cNvPicPr>
+            <a:picLocks noGrp="1" noChangeAspect="1" noChangeArrowheads="1"/>
+          </p:cNvPicPr>
+          <p:nvPr>
+            <p:ph idx="1"/>
+          </p:nvPr>
+        </p:nvPicPr>
+        <p:blipFill>
+          <a:blip r:embed="rId2" cstate="print"/>
+          <a:srcRect/>
+          <a:stretch>
+            <a:fillRect/>
+          </a:stretch>
+        </p:blipFill>
+        <p:spPr bwMode="auto">
+          <a:xfrm>
+            <a:off x="2362200" y="1828800"/>
+            <a:ext cx="4800600" cy="3796838"/>
+          </a:xfrm>
+          <a:prstGeom prst="rect">
+            <a:avLst/>
+          </a:prstGeom>
+          <a:noFill/>
+          <a:ln w="9525">
+            <a:noFill/>
+            <a:miter lim="800000"/>
+            <a:headEnd/>
+            <a:tailEnd/>
+          </a:ln>
+        </p:spPr>
+      </p:pic>
+    </p:spTree>
+  </p:cSld>
+  <p:clrMapOvr>
+    <a:masterClrMapping/>
+  </p:clrMapOvr>
+</p:sld>
+</file>
+
+<file path=ppt/slides/slide18.xml><?xml version="1.0" encoding="utf-8"?>
+<p:sld xmlns:a="http://schemas.openxmlformats.org/drawingml/2006/main" xmlns:r="http://schemas.openxmlformats.org/officeDocument/2006/relationships" xmlns:p="http://schemas.openxmlformats.org/presentationml/2006/main">
+  <p:cSld>
+    <p:spTree>
+      <p:nvGrpSpPr>
+        <p:cNvPr id="1" name=""/>
+        <p:cNvGrpSpPr/>
+        <p:nvPr/>
+      </p:nvGrpSpPr>
+      <p:grpSpPr>
+        <a:xfrm>
+          <a:off x="0" y="0"/>
+          <a:ext cx="0" cy="0"/>
+          <a:chOff x="0" y="0"/>
+          <a:chExt cx="0" cy="0"/>
+        </a:xfrm>
+      </p:grpSpPr>
+      <p:pic>
+        <p:nvPicPr>
+          <p:cNvPr id="1026" name="Picture 2"/>
+          <p:cNvPicPr>
+            <a:picLocks noGrp="1" noChangeAspect="1" noChangeArrowheads="1"/>
+          </p:cNvPicPr>
+          <p:nvPr>
+            <p:ph idx="1"/>
+          </p:nvPr>
+        </p:nvPicPr>
+        <p:blipFill>
+          <a:blip r:embed="rId2" cstate="print"/>
+          <a:srcRect/>
+          <a:stretch>
+            <a:fillRect/>
+          </a:stretch>
+        </p:blipFill>
+        <p:spPr>
+          <a:xfrm>
+            <a:off x="1143000" y="2057400"/>
+            <a:ext cx="6705600" cy="2891569"/>
+          </a:xfrm>
+        </p:spPr>
+      </p:pic>
+      <p:sp>
+        <p:nvSpPr>
+          <p:cNvPr id="2" name="Titel 1"/>
+          <p:cNvSpPr>
+            <a:spLocks noGrp="1"/>
+          </p:cNvSpPr>
+          <p:nvPr>
+            <p:ph type="title"/>
+          </p:nvPr>
+        </p:nvSpPr>
+        <p:spPr/>
+        <p:txBody>
+          <a:bodyPr/>
+          <a:lstStyle/>
+          <a:p>
+            <a:r>
+              <a:rPr lang="de-DE" dirty="0" smtClean="0"/>
+              <a:t>Unregelmäßige Polygone</a:t>
+            </a:r>
+            <a:endParaRPr lang="de-DE" dirty="0"/>
+          </a:p>
+        </p:txBody>
+      </p:sp>
+    </p:spTree>
+  </p:cSld>
+  <p:clrMapOvr>
+    <a:masterClrMapping/>
+  </p:clrMapOvr>
+</p:sld>
+</file>
+
+<file path=ppt/slides/slide19.xml><?xml version="1.0" encoding="utf-8"?>
+<p:sld xmlns:a="http://schemas.openxmlformats.org/drawingml/2006/main" xmlns:r="http://schemas.openxmlformats.org/officeDocument/2006/relationships" xmlns:p="http://schemas.openxmlformats.org/presentationml/2006/main">
+  <p:cSld>
+    <p:spTree>
+      <p:nvGrpSpPr>
+        <p:cNvPr id="1" name=""/>
+        <p:cNvGrpSpPr/>
+        <p:nvPr/>
+      </p:nvGrpSpPr>
+      <p:grpSpPr>
+        <a:xfrm>
+          <a:off x="0" y="0"/>
+          <a:ext cx="0" cy="0"/>
+          <a:chOff x="0" y="0"/>
+          <a:chExt cx="0" cy="0"/>
+        </a:xfrm>
+      </p:grpSpPr>
+      <p:sp>
+        <p:nvSpPr>
+          <p:cNvPr id="3" name="Titel 2"/>
+          <p:cNvSpPr>
+            <a:spLocks noGrp="1"/>
+          </p:cNvSpPr>
+          <p:nvPr>
+            <p:ph type="title"/>
+          </p:nvPr>
+        </p:nvSpPr>
+        <p:spPr/>
+        <p:txBody>
+          <a:bodyPr/>
+          <a:lstStyle/>
+          <a:p>
+            <a:r>
+              <a:rPr lang="de-DE" dirty="0" smtClean="0"/>
+              <a:t>Unregelmäßige Polygone</a:t>
+            </a:r>
+            <a:endParaRPr lang="de-DE" dirty="0"/>
+          </a:p>
+        </p:txBody>
+      </p:sp>
+      <p:pic>
+        <p:nvPicPr>
+          <p:cNvPr id="1026" name="Picture 2"/>
+          <p:cNvPicPr>
+            <a:picLocks noGrp="1" noChangeAspect="1" noChangeArrowheads="1"/>
+          </p:cNvPicPr>
+          <p:nvPr>
+            <p:ph idx="1"/>
+          </p:nvPr>
+        </p:nvPicPr>
+        <p:blipFill>
+          <a:blip r:embed="rId2" cstate="print"/>
+          <a:srcRect/>
+          <a:stretch>
+            <a:fillRect/>
+          </a:stretch>
+        </p:blipFill>
+        <p:spPr bwMode="auto">
+          <a:xfrm>
+            <a:off x="1066800" y="2057400"/>
+            <a:ext cx="7010400" cy="2133600"/>
+          </a:xfrm>
+          <a:prstGeom prst="rect">
+            <a:avLst/>
+          </a:prstGeom>
+          <a:noFill/>
+          <a:ln w="9525">
+            <a:noFill/>
+            <a:miter lim="800000"/>
+            <a:headEnd/>
+            <a:tailEnd/>
+          </a:ln>
+        </p:spPr>
+      </p:pic>
+    </p:spTree>
+  </p:cSld>
+  <p:clrMapOvr>
+    <a:masterClrMapping/>
+  </p:clrMapOvr>
+</p:sld>
+</file>
+
 <file path=ppt/slides/slide2.xml><?xml version="1.0" encoding="utf-8"?>
 <p:sld xmlns:a="http://schemas.openxmlformats.org/drawingml/2006/main" xmlns:r="http://schemas.openxmlformats.org/officeDocument/2006/relationships" xmlns:p="http://schemas.openxmlformats.org/presentationml/2006/main">
   <p:cSld>
@@ -12308,8 +12795,16 @@
           </a:p>
           <a:p>
             <a:r>
+              <a:rPr lang="de-DE" smtClean="0"/>
+              <a:t>Falls </a:t>
+            </a:r>
+            <a:r>
+              <a:rPr lang="de-DE" smtClean="0"/>
+              <a:t>n &gt; 3 </a:t>
+            </a:r>
+            <a:r>
               <a:rPr lang="de-DE" dirty="0" smtClean="0"/>
-              <a:t>Falls n&gt;3 -&gt; Teile Menge in zwei Hälften und gehe eine Rekursionsebene tiefer</a:t>
+              <a:t>-&gt; Teile Menge in zwei Hälften und gehe eine Rekursionsebene tiefer</a:t>
             </a:r>
           </a:p>
           <a:p>

</xml_diff>

<commit_message>
Herrrrrrsche and page indexes
</commit_message>
<xml_diff>
--- a/Geometrische.pptx
+++ b/Geometrische.pptx
@@ -1188,9 +1188,8 @@
             <a:extLst/>
           </a:lstStyle>
           <a:p>
-            <a:fld id="{24860E20-58B9-45E3-86EF-04912660DBBC}" type="datetimeFigureOut">
+            <a:fld id="{5A23A700-49C4-4806-8105-E3A63736BE3D}" type="datetime1">
               <a:rPr lang="de-DE" smtClean="0"/>
-              <a:pPr/>
               <a:t>07.07.2011</a:t>
             </a:fld>
             <a:endParaRPr lang="de-DE"/>
@@ -1386,9 +1385,8 @@
             <a:extLst/>
           </a:lstStyle>
           <a:p>
-            <a:fld id="{24860E20-58B9-45E3-86EF-04912660DBBC}" type="datetimeFigureOut">
+            <a:fld id="{D6C90A06-5F5E-49D2-ACB5-AB830B822587}" type="datetime1">
               <a:rPr lang="de-DE" smtClean="0"/>
-              <a:pPr/>
               <a:t>07.07.2011</a:t>
             </a:fld>
             <a:endParaRPr lang="de-DE"/>
@@ -1573,9 +1571,8 @@
             <a:extLst/>
           </a:lstStyle>
           <a:p>
-            <a:fld id="{24860E20-58B9-45E3-86EF-04912660DBBC}" type="datetimeFigureOut">
+            <a:fld id="{27804DE1-B36A-4FF9-AC0C-58B8B21FAC2B}" type="datetime1">
               <a:rPr lang="de-DE" smtClean="0"/>
-              <a:pPr/>
               <a:t>07.07.2011</a:t>
             </a:fld>
             <a:endParaRPr lang="de-DE"/>
@@ -1725,9 +1722,8 @@
             <a:extLst/>
           </a:lstStyle>
           <a:p>
-            <a:fld id="{24860E20-58B9-45E3-86EF-04912660DBBC}" type="datetimeFigureOut">
+            <a:fld id="{6FD50CE8-93EC-461C-8F38-7D2F777E84BA}" type="datetime1">
               <a:rPr lang="de-DE" smtClean="0"/>
-              <a:pPr/>
               <a:t>07.07.2011</a:t>
             </a:fld>
             <a:endParaRPr lang="de-DE"/>
@@ -1982,9 +1978,8 @@
             <a:extLst/>
           </a:lstStyle>
           <a:p>
-            <a:fld id="{24860E20-58B9-45E3-86EF-04912660DBBC}" type="datetimeFigureOut">
+            <a:fld id="{9EFB4353-FBCB-43F9-B81B-C67AA7B755B4}" type="datetime1">
               <a:rPr lang="de-DE" smtClean="0"/>
-              <a:pPr/>
               <a:t>07.07.2011</a:t>
             </a:fld>
             <a:endParaRPr lang="de-DE"/>
@@ -2393,9 +2388,8 @@
             <a:extLst/>
           </a:lstStyle>
           <a:p>
-            <a:fld id="{24860E20-58B9-45E3-86EF-04912660DBBC}" type="datetimeFigureOut">
+            <a:fld id="{07CD53F5-85FA-4F23-B917-B4F2C8A8DAF2}" type="datetime1">
               <a:rPr lang="de-DE" smtClean="0"/>
-              <a:pPr/>
               <a:t>07.07.2011</a:t>
             </a:fld>
             <a:endParaRPr lang="de-DE"/>
@@ -2841,9 +2835,8 @@
             <a:extLst/>
           </a:lstStyle>
           <a:p>
-            <a:fld id="{24860E20-58B9-45E3-86EF-04912660DBBC}" type="datetimeFigureOut">
+            <a:fld id="{57517793-9282-4947-83D5-0A00D244C1F8}" type="datetime1">
               <a:rPr lang="de-DE" smtClean="0"/>
-              <a:pPr/>
               <a:t>07.07.2011</a:t>
             </a:fld>
             <a:endParaRPr lang="de-DE"/>
@@ -2944,9 +2937,8 @@
             <a:extLst/>
           </a:lstStyle>
           <a:p>
-            <a:fld id="{24860E20-58B9-45E3-86EF-04912660DBBC}" type="datetimeFigureOut">
+            <a:fld id="{1BB5C83B-27F8-44B3-B2FD-47316D2022D2}" type="datetime1">
               <a:rPr lang="de-DE" smtClean="0"/>
-              <a:pPr/>
               <a:t>07.07.2011</a:t>
             </a:fld>
             <a:endParaRPr lang="de-DE"/>
@@ -3067,9 +3059,8 @@
             <a:extLst/>
           </a:lstStyle>
           <a:p>
-            <a:fld id="{24860E20-58B9-45E3-86EF-04912660DBBC}" type="datetimeFigureOut">
+            <a:fld id="{BA61A9DC-110C-473B-8809-DE8C230A4640}" type="datetime1">
               <a:rPr lang="de-DE" smtClean="0"/>
-              <a:pPr/>
               <a:t>07.07.2011</a:t>
             </a:fld>
             <a:endParaRPr lang="de-DE"/>
@@ -3343,9 +3334,8 @@
             <a:extLst/>
           </a:lstStyle>
           <a:p>
-            <a:fld id="{24860E20-58B9-45E3-86EF-04912660DBBC}" type="datetimeFigureOut">
+            <a:fld id="{B5679F18-2468-4D04-915C-F7698EB9C057}" type="datetime1">
               <a:rPr lang="de-DE" smtClean="0"/>
-              <a:pPr/>
               <a:t>07.07.2011</a:t>
             </a:fld>
             <a:endParaRPr lang="de-DE"/>
@@ -3550,9 +3540,8 @@
             <a:extLst/>
           </a:lstStyle>
           <a:p>
-            <a:fld id="{24860E20-58B9-45E3-86EF-04912660DBBC}" type="datetimeFigureOut">
+            <a:fld id="{BEECEAF4-36C3-46FC-8193-6831551427B2}" type="datetime1">
               <a:rPr lang="de-DE" smtClean="0"/>
-              <a:pPr/>
               <a:t>07.07.2011</a:t>
             </a:fld>
             <a:endParaRPr lang="de-DE"/>
@@ -4661,9 +4650,8 @@
             <a:extLst/>
           </a:lstStyle>
           <a:p>
-            <a:fld id="{24860E20-58B9-45E3-86EF-04912660DBBC}" type="datetimeFigureOut">
+            <a:fld id="{AB37C661-E4F6-4220-AAA9-7D65222B0DF3}" type="datetime1">
               <a:rPr lang="de-DE" smtClean="0"/>
-              <a:pPr/>
               <a:t>07.07.2011</a:t>
             </a:fld>
             <a:endParaRPr lang="de-DE"/>
@@ -4763,6 +4751,7 @@
     <p:sldLayoutId id="2147483670" r:id="rId10"/>
     <p:sldLayoutId id="2147483671" r:id="rId11"/>
   </p:sldLayoutIdLst>
+  <p:hf hdr="0" ftr="0" dt="0"/>
   <p:txStyles>
     <p:titleStyle>
       <a:lvl1pPr algn="l" rtl="0" eaLnBrk="1" latinLnBrk="0" hangingPunct="1">
@@ -5135,6 +5124,30 @@
           </a:p>
         </p:txBody>
       </p:sp>
+      <p:sp>
+        <p:nvSpPr>
+          <p:cNvPr id="4" name="Foliennummernplatzhalter 3"/>
+          <p:cNvSpPr>
+            <a:spLocks noGrp="1"/>
+          </p:cNvSpPr>
+          <p:nvPr>
+            <p:ph type="sldNum" sz="quarter" idx="12"/>
+          </p:nvPr>
+        </p:nvSpPr>
+        <p:spPr/>
+        <p:txBody>
+          <a:bodyPr/>
+          <a:lstStyle/>
+          <a:p>
+            <a:fld id="{5E12E669-1740-4FF5-B4FF-F8F59BA58B32}" type="slidenum">
+              <a:rPr lang="de-DE" smtClean="0"/>
+              <a:pPr/>
+              <a:t>1</a:t>
+            </a:fld>
+            <a:endParaRPr lang="de-DE"/>
+          </a:p>
+        </p:txBody>
+      </p:sp>
     </p:spTree>
     <p:extLst>
       <p:ext uri="{BB962C8B-B14F-4D97-AF65-F5344CB8AC3E}">
@@ -6093,6 +6106,30 @@
           </a:fontRef>
         </p:style>
       </p:cxnSp>
+      <p:sp>
+        <p:nvSpPr>
+          <p:cNvPr id="17" name="Foliennummernplatzhalter 16"/>
+          <p:cNvSpPr>
+            <a:spLocks noGrp="1"/>
+          </p:cNvSpPr>
+          <p:nvPr>
+            <p:ph type="sldNum" sz="quarter" idx="12"/>
+          </p:nvPr>
+        </p:nvSpPr>
+        <p:spPr/>
+        <p:txBody>
+          <a:bodyPr/>
+          <a:lstStyle/>
+          <a:p>
+            <a:fld id="{5E12E669-1740-4FF5-B4FF-F8F59BA58B32}" type="slidenum">
+              <a:rPr lang="de-DE" smtClean="0"/>
+              <a:pPr/>
+              <a:t>10</a:t>
+            </a:fld>
+            <a:endParaRPr lang="de-DE"/>
+          </a:p>
+        </p:txBody>
+      </p:sp>
     </p:spTree>
     <p:extLst>
       <p:ext uri="{BB962C8B-B14F-4D97-AF65-F5344CB8AC3E}">
@@ -6861,6 +6898,30 @@
           </a:fontRef>
         </p:style>
       </p:cxnSp>
+      <p:sp>
+        <p:nvSpPr>
+          <p:cNvPr id="17" name="Foliennummernplatzhalter 16"/>
+          <p:cNvSpPr>
+            <a:spLocks noGrp="1"/>
+          </p:cNvSpPr>
+          <p:nvPr>
+            <p:ph type="sldNum" sz="quarter" idx="12"/>
+          </p:nvPr>
+        </p:nvSpPr>
+        <p:spPr/>
+        <p:txBody>
+          <a:bodyPr/>
+          <a:lstStyle/>
+          <a:p>
+            <a:fld id="{5E12E669-1740-4FF5-B4FF-F8F59BA58B32}" type="slidenum">
+              <a:rPr lang="de-DE" smtClean="0"/>
+              <a:pPr/>
+              <a:t>11</a:t>
+            </a:fld>
+            <a:endParaRPr lang="de-DE"/>
+          </a:p>
+        </p:txBody>
+      </p:sp>
     </p:spTree>
     <p:extLst>
       <p:ext uri="{BB962C8B-B14F-4D97-AF65-F5344CB8AC3E}">
@@ -7527,6 +7588,30 @@
           </a:fontRef>
         </p:style>
       </p:cxnSp>
+      <p:sp>
+        <p:nvSpPr>
+          <p:cNvPr id="17" name="Foliennummernplatzhalter 16"/>
+          <p:cNvSpPr>
+            <a:spLocks noGrp="1"/>
+          </p:cNvSpPr>
+          <p:nvPr>
+            <p:ph type="sldNum" sz="quarter" idx="12"/>
+          </p:nvPr>
+        </p:nvSpPr>
+        <p:spPr/>
+        <p:txBody>
+          <a:bodyPr/>
+          <a:lstStyle/>
+          <a:p>
+            <a:fld id="{5E12E669-1740-4FF5-B4FF-F8F59BA58B32}" type="slidenum">
+              <a:rPr lang="de-DE" smtClean="0"/>
+              <a:pPr/>
+              <a:t>12</a:t>
+            </a:fld>
+            <a:endParaRPr lang="de-DE"/>
+          </a:p>
+        </p:txBody>
+      </p:sp>
     </p:spTree>
     <p:extLst>
       <p:ext uri="{BB962C8B-B14F-4D97-AF65-F5344CB8AC3E}">
@@ -7860,6 +7945,30 @@
           </a:p>
         </p:txBody>
       </p:sp>
+      <p:sp>
+        <p:nvSpPr>
+          <p:cNvPr id="4" name="Foliennummernplatzhalter 3"/>
+          <p:cNvSpPr>
+            <a:spLocks noGrp="1"/>
+          </p:cNvSpPr>
+          <p:nvPr>
+            <p:ph type="sldNum" sz="quarter" idx="12"/>
+          </p:nvPr>
+        </p:nvSpPr>
+        <p:spPr/>
+        <p:txBody>
+          <a:bodyPr/>
+          <a:lstStyle/>
+          <a:p>
+            <a:fld id="{5E12E669-1740-4FF5-B4FF-F8F59BA58B32}" type="slidenum">
+              <a:rPr lang="de-DE" smtClean="0"/>
+              <a:pPr/>
+              <a:t>13</a:t>
+            </a:fld>
+            <a:endParaRPr lang="de-DE"/>
+          </a:p>
+        </p:txBody>
+      </p:sp>
     </p:spTree>
     <p:extLst>
       <p:ext uri="{BB962C8B-B14F-4D97-AF65-F5344CB8AC3E}">
@@ -7946,11 +8055,42 @@
           </a:p>
         </p:txBody>
       </p:sp>
+      <p:sp>
+        <p:nvSpPr>
+          <p:cNvPr id="4" name="Foliennummernplatzhalter 3"/>
+          <p:cNvSpPr>
+            <a:spLocks noGrp="1"/>
+          </p:cNvSpPr>
+          <p:nvPr>
+            <p:ph type="sldNum" sz="quarter" idx="12"/>
+          </p:nvPr>
+        </p:nvSpPr>
+        <p:spPr/>
+        <p:txBody>
+          <a:bodyPr/>
+          <a:lstStyle/>
+          <a:p>
+            <a:fld id="{5E12E669-1740-4FF5-B4FF-F8F59BA58B32}" type="slidenum">
+              <a:rPr lang="de-DE" smtClean="0"/>
+              <a:pPr/>
+              <a:t>14</a:t>
+            </a:fld>
+            <a:endParaRPr lang="de-DE"/>
+          </a:p>
+        </p:txBody>
+      </p:sp>
     </p:spTree>
   </p:cSld>
   <p:clrMapOvr>
     <a:masterClrMapping/>
   </p:clrMapOvr>
+  <p:timing>
+    <p:tnLst>
+      <p:par>
+        <p:cTn id="1" dur="indefinite" restart="never" nodeType="tmRoot"/>
+      </p:par>
+    </p:tnLst>
+  </p:timing>
 </p:sld>
 </file>
 
@@ -8018,11 +8158,42 @@
           </a:p>
         </p:txBody>
       </p:sp>
+      <p:sp>
+        <p:nvSpPr>
+          <p:cNvPr id="3" name="Foliennummernplatzhalter 2"/>
+          <p:cNvSpPr>
+            <a:spLocks noGrp="1"/>
+          </p:cNvSpPr>
+          <p:nvPr>
+            <p:ph type="sldNum" sz="quarter" idx="12"/>
+          </p:nvPr>
+        </p:nvSpPr>
+        <p:spPr/>
+        <p:txBody>
+          <a:bodyPr/>
+          <a:lstStyle/>
+          <a:p>
+            <a:fld id="{5E12E669-1740-4FF5-B4FF-F8F59BA58B32}" type="slidenum">
+              <a:rPr lang="de-DE" smtClean="0"/>
+              <a:pPr/>
+              <a:t>15</a:t>
+            </a:fld>
+            <a:endParaRPr lang="de-DE"/>
+          </a:p>
+        </p:txBody>
+      </p:sp>
     </p:spTree>
   </p:cSld>
   <p:clrMapOvr>
     <a:masterClrMapping/>
   </p:clrMapOvr>
+  <p:timing>
+    <p:tnLst>
+      <p:par>
+        <p:cTn id="1" dur="indefinite" restart="never" nodeType="tmRoot"/>
+      </p:par>
+    </p:tnLst>
+  </p:timing>
 </p:sld>
 </file>
 
@@ -8090,11 +8261,42 @@
           </a:p>
         </p:txBody>
       </p:sp>
+      <p:sp>
+        <p:nvSpPr>
+          <p:cNvPr id="3" name="Foliennummernplatzhalter 2"/>
+          <p:cNvSpPr>
+            <a:spLocks noGrp="1"/>
+          </p:cNvSpPr>
+          <p:nvPr>
+            <p:ph type="sldNum" sz="quarter" idx="12"/>
+          </p:nvPr>
+        </p:nvSpPr>
+        <p:spPr/>
+        <p:txBody>
+          <a:bodyPr/>
+          <a:lstStyle/>
+          <a:p>
+            <a:fld id="{5E12E669-1740-4FF5-B4FF-F8F59BA58B32}" type="slidenum">
+              <a:rPr lang="de-DE" smtClean="0"/>
+              <a:pPr/>
+              <a:t>16</a:t>
+            </a:fld>
+            <a:endParaRPr lang="de-DE"/>
+          </a:p>
+        </p:txBody>
+      </p:sp>
     </p:spTree>
   </p:cSld>
   <p:clrMapOvr>
     <a:masterClrMapping/>
   </p:clrMapOvr>
+  <p:timing>
+    <p:tnLst>
+      <p:par>
+        <p:cTn id="1" dur="indefinite" restart="never" nodeType="tmRoot"/>
+      </p:par>
+    </p:tnLst>
+  </p:timing>
 </p:sld>
 </file>
 
@@ -8172,11 +8374,42 @@
           </a:ln>
         </p:spPr>
       </p:pic>
+      <p:sp>
+        <p:nvSpPr>
+          <p:cNvPr id="3" name="Foliennummernplatzhalter 2"/>
+          <p:cNvSpPr>
+            <a:spLocks noGrp="1"/>
+          </p:cNvSpPr>
+          <p:nvPr>
+            <p:ph type="sldNum" sz="quarter" idx="12"/>
+          </p:nvPr>
+        </p:nvSpPr>
+        <p:spPr/>
+        <p:txBody>
+          <a:bodyPr/>
+          <a:lstStyle/>
+          <a:p>
+            <a:fld id="{5E12E669-1740-4FF5-B4FF-F8F59BA58B32}" type="slidenum">
+              <a:rPr lang="de-DE" smtClean="0"/>
+              <a:pPr/>
+              <a:t>17</a:t>
+            </a:fld>
+            <a:endParaRPr lang="de-DE"/>
+          </a:p>
+        </p:txBody>
+      </p:sp>
     </p:spTree>
   </p:cSld>
   <p:clrMapOvr>
     <a:masterClrMapping/>
   </p:clrMapOvr>
+  <p:timing>
+    <p:tnLst>
+      <p:par>
+        <p:cTn id="1" dur="indefinite" restart="never" nodeType="tmRoot"/>
+      </p:par>
+    </p:tnLst>
+  </p:timing>
 </p:sld>
 </file>
 
@@ -8244,11 +8477,42 @@
           </a:p>
         </p:txBody>
       </p:sp>
+      <p:sp>
+        <p:nvSpPr>
+          <p:cNvPr id="3" name="Foliennummernplatzhalter 2"/>
+          <p:cNvSpPr>
+            <a:spLocks noGrp="1"/>
+          </p:cNvSpPr>
+          <p:nvPr>
+            <p:ph type="sldNum" sz="quarter" idx="12"/>
+          </p:nvPr>
+        </p:nvSpPr>
+        <p:spPr/>
+        <p:txBody>
+          <a:bodyPr/>
+          <a:lstStyle/>
+          <a:p>
+            <a:fld id="{5E12E669-1740-4FF5-B4FF-F8F59BA58B32}" type="slidenum">
+              <a:rPr lang="de-DE" smtClean="0"/>
+              <a:pPr/>
+              <a:t>18</a:t>
+            </a:fld>
+            <a:endParaRPr lang="de-DE"/>
+          </a:p>
+        </p:txBody>
+      </p:sp>
     </p:spTree>
   </p:cSld>
   <p:clrMapOvr>
     <a:masterClrMapping/>
   </p:clrMapOvr>
+  <p:timing>
+    <p:tnLst>
+      <p:par>
+        <p:cTn id="1" dur="indefinite" restart="never" nodeType="tmRoot"/>
+      </p:par>
+    </p:tnLst>
+  </p:timing>
 </p:sld>
 </file>
 
@@ -8326,11 +8590,42 @@
           </a:ln>
         </p:spPr>
       </p:pic>
+      <p:sp>
+        <p:nvSpPr>
+          <p:cNvPr id="2" name="Foliennummernplatzhalter 1"/>
+          <p:cNvSpPr>
+            <a:spLocks noGrp="1"/>
+          </p:cNvSpPr>
+          <p:nvPr>
+            <p:ph type="sldNum" sz="quarter" idx="12"/>
+          </p:nvPr>
+        </p:nvSpPr>
+        <p:spPr/>
+        <p:txBody>
+          <a:bodyPr/>
+          <a:lstStyle/>
+          <a:p>
+            <a:fld id="{5E12E669-1740-4FF5-B4FF-F8F59BA58B32}" type="slidenum">
+              <a:rPr lang="de-DE" smtClean="0"/>
+              <a:pPr/>
+              <a:t>19</a:t>
+            </a:fld>
+            <a:endParaRPr lang="de-DE"/>
+          </a:p>
+        </p:txBody>
+      </p:sp>
     </p:spTree>
   </p:cSld>
   <p:clrMapOvr>
     <a:masterClrMapping/>
   </p:clrMapOvr>
+  <p:timing>
+    <p:tnLst>
+      <p:par>
+        <p:cTn id="1" dur="indefinite" restart="never" nodeType="tmRoot"/>
+      </p:par>
+    </p:tnLst>
+  </p:timing>
 </p:sld>
 </file>
 
@@ -8447,6 +8742,30 @@
               <a:t>Einsatzbereiche</a:t>
             </a:r>
             <a:endParaRPr lang="de-DE" dirty="0"/>
+          </a:p>
+        </p:txBody>
+      </p:sp>
+      <p:sp>
+        <p:nvSpPr>
+          <p:cNvPr id="4" name="Foliennummernplatzhalter 3"/>
+          <p:cNvSpPr>
+            <a:spLocks noGrp="1"/>
+          </p:cNvSpPr>
+          <p:nvPr>
+            <p:ph type="sldNum" sz="quarter" idx="12"/>
+          </p:nvPr>
+        </p:nvSpPr>
+        <p:spPr/>
+        <p:txBody>
+          <a:bodyPr/>
+          <a:lstStyle/>
+          <a:p>
+            <a:fld id="{5E12E669-1740-4FF5-B4FF-F8F59BA58B32}" type="slidenum">
+              <a:rPr lang="de-DE" smtClean="0"/>
+              <a:pPr/>
+              <a:t>2</a:t>
+            </a:fld>
+            <a:endParaRPr lang="de-DE"/>
           </a:p>
         </p:txBody>
       </p:sp>
@@ -8563,6 +8882,30 @@
           </a:p>
         </p:txBody>
       </p:sp>
+      <p:sp>
+        <p:nvSpPr>
+          <p:cNvPr id="4" name="Foliennummernplatzhalter 3"/>
+          <p:cNvSpPr>
+            <a:spLocks noGrp="1"/>
+          </p:cNvSpPr>
+          <p:nvPr>
+            <p:ph type="sldNum" sz="quarter" idx="12"/>
+          </p:nvPr>
+        </p:nvSpPr>
+        <p:spPr/>
+        <p:txBody>
+          <a:bodyPr/>
+          <a:lstStyle/>
+          <a:p>
+            <a:fld id="{5E12E669-1740-4FF5-B4FF-F8F59BA58B32}" type="slidenum">
+              <a:rPr lang="de-DE" smtClean="0"/>
+              <a:pPr/>
+              <a:t>3</a:t>
+            </a:fld>
+            <a:endParaRPr lang="de-DE"/>
+          </a:p>
+        </p:txBody>
+      </p:sp>
     </p:spTree>
     <p:extLst>
       <p:ext uri="{BB962C8B-B14F-4D97-AF65-F5344CB8AC3E}">
@@ -9445,6 +9788,30 @@
           </a:p>
         </p:txBody>
       </p:sp>
+      <p:sp>
+        <p:nvSpPr>
+          <p:cNvPr id="17" name="Foliennummernplatzhalter 16"/>
+          <p:cNvSpPr>
+            <a:spLocks noGrp="1"/>
+          </p:cNvSpPr>
+          <p:nvPr>
+            <p:ph type="sldNum" sz="quarter" idx="12"/>
+          </p:nvPr>
+        </p:nvSpPr>
+        <p:spPr/>
+        <p:txBody>
+          <a:bodyPr/>
+          <a:lstStyle/>
+          <a:p>
+            <a:fld id="{5E12E669-1740-4FF5-B4FF-F8F59BA58B32}" type="slidenum">
+              <a:rPr lang="de-DE" smtClean="0"/>
+              <a:pPr/>
+              <a:t>4</a:t>
+            </a:fld>
+            <a:endParaRPr lang="de-DE"/>
+          </a:p>
+        </p:txBody>
+      </p:sp>
     </p:spTree>
     <p:extLst>
       <p:ext uri="{BB962C8B-B14F-4D97-AF65-F5344CB8AC3E}">
@@ -10889,6 +11256,30 @@
           </a:p>
         </p:txBody>
       </p:sp>
+      <p:sp>
+        <p:nvSpPr>
+          <p:cNvPr id="17" name="Foliennummernplatzhalter 16"/>
+          <p:cNvSpPr>
+            <a:spLocks noGrp="1"/>
+          </p:cNvSpPr>
+          <p:nvPr>
+            <p:ph type="sldNum" sz="quarter" idx="12"/>
+          </p:nvPr>
+        </p:nvSpPr>
+        <p:spPr/>
+        <p:txBody>
+          <a:bodyPr/>
+          <a:lstStyle/>
+          <a:p>
+            <a:fld id="{5E12E669-1740-4FF5-B4FF-F8F59BA58B32}" type="slidenum">
+              <a:rPr lang="de-DE" smtClean="0"/>
+              <a:pPr/>
+              <a:t>5</a:t>
+            </a:fld>
+            <a:endParaRPr lang="de-DE"/>
+          </a:p>
+        </p:txBody>
+      </p:sp>
     </p:spTree>
     <p:extLst>
       <p:ext uri="{BB962C8B-B14F-4D97-AF65-F5344CB8AC3E}">
@@ -10947,10 +11338,18 @@
           <a:lstStyle/>
           <a:p>
             <a:r>
-              <a:rPr lang="de-DE" smtClean="0"/>
-              <a:t>Rekursive Idee (Teile und Heersche)</a:t>
+              <a:rPr lang="de-DE" dirty="0" smtClean="0"/>
+              <a:t>Rekursive Idee (Teile und </a:t>
             </a:r>
-            <a:endParaRPr lang="de-DE"/>
+            <a:r>
+              <a:rPr lang="de-DE" dirty="0" smtClean="0"/>
+              <a:t>Herrsche</a:t>
+            </a:r>
+            <a:r>
+              <a:rPr lang="de-DE" dirty="0" smtClean="0"/>
+              <a:t>)</a:t>
+            </a:r>
+            <a:endParaRPr lang="de-DE" dirty="0"/>
           </a:p>
         </p:txBody>
       </p:sp>
@@ -11682,6 +12081,30 @@
               <a:rPr lang="de-DE" smtClean="0"/>
               <a:t>Finde Punktepaar mit kleinstem Abstand</a:t>
             </a:r>
+            <a:endParaRPr lang="de-DE"/>
+          </a:p>
+        </p:txBody>
+      </p:sp>
+      <p:sp>
+        <p:nvSpPr>
+          <p:cNvPr id="17" name="Foliennummernplatzhalter 16"/>
+          <p:cNvSpPr>
+            <a:spLocks noGrp="1"/>
+          </p:cNvSpPr>
+          <p:nvPr>
+            <p:ph type="sldNum" sz="quarter" idx="12"/>
+          </p:nvPr>
+        </p:nvSpPr>
+        <p:spPr/>
+        <p:txBody>
+          <a:bodyPr/>
+          <a:lstStyle/>
+          <a:p>
+            <a:fld id="{5E12E669-1740-4FF5-B4FF-F8F59BA58B32}" type="slidenum">
+              <a:rPr lang="de-DE" smtClean="0"/>
+              <a:pPr/>
+              <a:t>6</a:t>
+            </a:fld>
             <a:endParaRPr lang="de-DE"/>
           </a:p>
         </p:txBody>
@@ -12729,6 +13152,30 @@
           </a:p>
         </p:txBody>
       </p:sp>
+      <p:sp>
+        <p:nvSpPr>
+          <p:cNvPr id="18" name="Foliennummernplatzhalter 17"/>
+          <p:cNvSpPr>
+            <a:spLocks noGrp="1"/>
+          </p:cNvSpPr>
+          <p:nvPr>
+            <p:ph type="sldNum" sz="quarter" idx="12"/>
+          </p:nvPr>
+        </p:nvSpPr>
+        <p:spPr/>
+        <p:txBody>
+          <a:bodyPr/>
+          <a:lstStyle/>
+          <a:p>
+            <a:fld id="{5E12E669-1740-4FF5-B4FF-F8F59BA58B32}" type="slidenum">
+              <a:rPr lang="de-DE" smtClean="0"/>
+              <a:pPr/>
+              <a:t>7</a:t>
+            </a:fld>
+            <a:endParaRPr lang="de-DE"/>
+          </a:p>
+        </p:txBody>
+      </p:sp>
     </p:spTree>
     <p:extLst>
       <p:ext uri="{BB962C8B-B14F-4D97-AF65-F5344CB8AC3E}">
@@ -12796,11 +13243,7 @@
           <a:p>
             <a:r>
               <a:rPr lang="de-DE" smtClean="0"/>
-              <a:t>Falls </a:t>
-            </a:r>
-            <a:r>
-              <a:rPr lang="de-DE" smtClean="0"/>
-              <a:t>n &gt; 3 </a:t>
+              <a:t>Falls n &gt; 3 </a:t>
             </a:r>
             <a:r>
               <a:rPr lang="de-DE" dirty="0" smtClean="0"/>
@@ -12857,6 +13300,30 @@
               <a:t>Kleinster Abstand – Teil 3</a:t>
             </a:r>
             <a:endParaRPr lang="de-DE" dirty="0"/>
+          </a:p>
+        </p:txBody>
+      </p:sp>
+      <p:sp>
+        <p:nvSpPr>
+          <p:cNvPr id="4" name="Foliennummernplatzhalter 3"/>
+          <p:cNvSpPr>
+            <a:spLocks noGrp="1"/>
+          </p:cNvSpPr>
+          <p:nvPr>
+            <p:ph type="sldNum" sz="quarter" idx="12"/>
+          </p:nvPr>
+        </p:nvSpPr>
+        <p:spPr/>
+        <p:txBody>
+          <a:bodyPr/>
+          <a:lstStyle/>
+          <a:p>
+            <a:fld id="{5E12E669-1740-4FF5-B4FF-F8F59BA58B32}" type="slidenum">
+              <a:rPr lang="de-DE" smtClean="0"/>
+              <a:pPr/>
+              <a:t>8</a:t>
+            </a:fld>
+            <a:endParaRPr lang="de-DE"/>
           </a:p>
         </p:txBody>
       </p:sp>
@@ -13738,6 +14205,30 @@
           </a:fontRef>
         </p:style>
       </p:cxnSp>
+      <p:sp>
+        <p:nvSpPr>
+          <p:cNvPr id="17" name="Foliennummernplatzhalter 16"/>
+          <p:cNvSpPr>
+            <a:spLocks noGrp="1"/>
+          </p:cNvSpPr>
+          <p:nvPr>
+            <p:ph type="sldNum" sz="quarter" idx="12"/>
+          </p:nvPr>
+        </p:nvSpPr>
+        <p:spPr/>
+        <p:txBody>
+          <a:bodyPr/>
+          <a:lstStyle/>
+          <a:p>
+            <a:fld id="{5E12E669-1740-4FF5-B4FF-F8F59BA58B32}" type="slidenum">
+              <a:rPr lang="de-DE" smtClean="0"/>
+              <a:pPr/>
+              <a:t>9</a:t>
+            </a:fld>
+            <a:endParaRPr lang="de-DE"/>
+          </a:p>
+        </p:txBody>
+      </p:sp>
     </p:spTree>
     <p:extLst>
       <p:ext uri="{BB962C8B-B14F-4D97-AF65-F5344CB8AC3E}">

</xml_diff>